<commit_message>
update poster in ppt
</commit_message>
<xml_diff>
--- a/poster/TransitTrails_poster.pptx
+++ b/poster/TransitTrails_poster.pptx
@@ -271,7 +271,7 @@
           <a:p>
             <a:fld id="{D728701E-CAF4-4159-9B3E-41C86DFFA30D}" type="datetimeFigureOut">
               <a:rPr lang="en-US" smtClean="0"/>
-              <a:t>3/8/14</a:t>
+              <a:t>3/12/14</a:t>
             </a:fld>
             <a:endParaRPr lang="en-US"/>
           </a:p>
@@ -814,7 +814,7 @@
           <a:p>
             <a:fld id="{D728701E-CAF4-4159-9B3E-41C86DFFA30D}" type="datetimeFigureOut">
               <a:rPr lang="en-US" smtClean="0"/>
-              <a:t>3/8/14</a:t>
+              <a:t>3/12/14</a:t>
             </a:fld>
             <a:endParaRPr lang="en-US"/>
           </a:p>
@@ -950,7 +950,7 @@
           <a:p>
             <a:fld id="{D728701E-CAF4-4159-9B3E-41C86DFFA30D}" type="datetimeFigureOut">
               <a:rPr lang="en-US" smtClean="0"/>
-              <a:t>3/8/14</a:t>
+              <a:t>3/12/14</a:t>
             </a:fld>
             <a:endParaRPr lang="en-US"/>
           </a:p>
@@ -1288,7 +1288,7 @@
           <a:p>
             <a:fld id="{D728701E-CAF4-4159-9B3E-41C86DFFA30D}" type="datetimeFigureOut">
               <a:rPr lang="en-US" smtClean="0"/>
-              <a:t>3/8/14</a:t>
+              <a:t>3/12/14</a:t>
             </a:fld>
             <a:endParaRPr lang="en-US"/>
           </a:p>
@@ -1614,7 +1614,7 @@
           <a:p>
             <a:fld id="{D728701E-CAF4-4159-9B3E-41C86DFFA30D}" type="datetimeFigureOut">
               <a:rPr lang="en-US" smtClean="0"/>
-              <a:t>3/8/14</a:t>
+              <a:t>3/12/14</a:t>
             </a:fld>
             <a:endParaRPr lang="en-US"/>
           </a:p>
@@ -1912,7 +1912,7 @@
           <a:p>
             <a:fld id="{D728701E-CAF4-4159-9B3E-41C86DFFA30D}" type="datetimeFigureOut">
               <a:rPr lang="en-US" smtClean="0"/>
-              <a:t>3/8/14</a:t>
+              <a:t>3/12/14</a:t>
             </a:fld>
             <a:endParaRPr lang="en-US"/>
           </a:p>
@@ -2299,7 +2299,7 @@
           <a:p>
             <a:fld id="{D728701E-CAF4-4159-9B3E-41C86DFFA30D}" type="datetimeFigureOut">
               <a:rPr lang="en-US" smtClean="0"/>
-              <a:t>3/8/14</a:t>
+              <a:t>3/12/14</a:t>
             </a:fld>
             <a:endParaRPr lang="en-US"/>
           </a:p>
@@ -2719,7 +2719,7 @@
           <a:p>
             <a:fld id="{D728701E-CAF4-4159-9B3E-41C86DFFA30D}" type="datetimeFigureOut">
               <a:rPr lang="en-US" smtClean="0"/>
-              <a:t>3/8/14</a:t>
+              <a:t>3/12/14</a:t>
             </a:fld>
             <a:endParaRPr lang="en-US"/>
           </a:p>
@@ -3267,7 +3267,7 @@
           <a:p>
             <a:fld id="{D728701E-CAF4-4159-9B3E-41C86DFFA30D}" type="datetimeFigureOut">
               <a:rPr lang="en-US" smtClean="0"/>
-              <a:t>3/8/14</a:t>
+              <a:t>3/12/14</a:t>
             </a:fld>
             <a:endParaRPr lang="en-US"/>
           </a:p>
@@ -3625,7 +3625,7 @@
           <a:p>
             <a:fld id="{D728701E-CAF4-4159-9B3E-41C86DFFA30D}" type="datetimeFigureOut">
               <a:rPr lang="en-US" smtClean="0"/>
-              <a:t>3/8/14</a:t>
+              <a:t>3/12/14</a:t>
             </a:fld>
             <a:endParaRPr lang="en-US"/>
           </a:p>
@@ -3840,7 +3840,7 @@
           <a:p>
             <a:fld id="{D728701E-CAF4-4159-9B3E-41C86DFFA30D}" type="datetimeFigureOut">
               <a:rPr lang="en-US" smtClean="0"/>
-              <a:t>3/8/14</a:t>
+              <a:t>3/12/14</a:t>
             </a:fld>
             <a:endParaRPr lang="en-US"/>
           </a:p>
@@ -4147,7 +4147,7 @@
           <a:p>
             <a:fld id="{D728701E-CAF4-4159-9B3E-41C86DFFA30D}" type="datetimeFigureOut">
               <a:rPr lang="en-US" smtClean="0"/>
-              <a:t>3/8/14</a:t>
+              <a:t>3/12/14</a:t>
             </a:fld>
             <a:endParaRPr lang="en-US"/>
           </a:p>
@@ -4403,7 +4403,7 @@
           <a:p>
             <a:fld id="{D728701E-CAF4-4159-9B3E-41C86DFFA30D}" type="datetimeFigureOut">
               <a:rPr lang="en-US" smtClean="0"/>
-              <a:t>3/8/14</a:t>
+              <a:t>3/12/14</a:t>
             </a:fld>
             <a:endParaRPr lang="en-US"/>
           </a:p>
@@ -4792,7 +4792,7 @@
           <a:p>
             <a:fld id="{D728701E-CAF4-4159-9B3E-41C86DFFA30D}" type="datetimeFigureOut">
               <a:rPr lang="en-US" smtClean="0"/>
-              <a:t>3/8/14</a:t>
+              <a:t>3/12/14</a:t>
             </a:fld>
             <a:endParaRPr lang="en-US"/>
           </a:p>
@@ -5381,7 +5381,7 @@
           <a:p>
             <a:fld id="{D728701E-CAF4-4159-9B3E-41C86DFFA30D}" type="datetimeFigureOut">
               <a:rPr lang="en-US" smtClean="0"/>
-              <a:t>3/8/14</a:t>
+              <a:t>3/12/14</a:t>
             </a:fld>
             <a:endParaRPr lang="en-US"/>
           </a:p>
@@ -5896,7 +5896,7 @@
           <a:p>
             <a:fld id="{D728701E-CAF4-4159-9B3E-41C86DFFA30D}" type="datetimeFigureOut">
               <a:rPr lang="en-US" smtClean="0"/>
-              <a:t>3/8/14</a:t>
+              <a:t>3/12/14</a:t>
             </a:fld>
             <a:endParaRPr lang="en-US"/>
           </a:p>
@@ -6269,7 +6269,7 @@
           <a:p>
             <a:fld id="{D728701E-CAF4-4159-9B3E-41C86DFFA30D}" type="datetimeFigureOut">
               <a:rPr lang="en-US" smtClean="0"/>
-              <a:t>3/8/14</a:t>
+              <a:t>3/12/14</a:t>
             </a:fld>
             <a:endParaRPr lang="en-US"/>
           </a:p>
@@ -6668,7 +6668,7 @@
           <a:p>
             <a:fld id="{D728701E-CAF4-4159-9B3E-41C86DFFA30D}" type="datetimeFigureOut">
               <a:rPr lang="en-US" smtClean="0"/>
-              <a:t>3/8/14</a:t>
+              <a:t>3/12/14</a:t>
             </a:fld>
             <a:endParaRPr lang="en-US"/>
           </a:p>
@@ -7088,7 +7088,7 @@
           <a:p>
             <a:fld id="{D728701E-CAF4-4159-9B3E-41C86DFFA30D}" type="datetimeFigureOut">
               <a:rPr lang="en-US" smtClean="0"/>
-              <a:t>3/8/14</a:t>
+              <a:t>3/12/14</a:t>
             </a:fld>
             <a:endParaRPr lang="en-US"/>
           </a:p>
@@ -7471,7 +7471,7 @@
           <a:p>
             <a:fld id="{D728701E-CAF4-4159-9B3E-41C86DFFA30D}" type="datetimeFigureOut">
               <a:rPr lang="en-US" smtClean="0"/>
-              <a:t>3/8/14</a:t>
+              <a:t>3/12/14</a:t>
             </a:fld>
             <a:endParaRPr lang="en-US"/>
           </a:p>
@@ -7936,13 +7936,13 @@
         </p:nvSpPr>
         <p:spPr>
           <a:xfrm>
-            <a:off x="0" y="924079"/>
-            <a:ext cx="29260799" cy="10378921"/>
+            <a:off x="0" y="-168120"/>
+            <a:ext cx="29260799" cy="4732512"/>
           </a:xfrm>
         </p:spPr>
         <p:txBody>
           <a:bodyPr>
-            <a:normAutofit/>
+            <a:normAutofit fontScale="90000"/>
           </a:bodyPr>
           <a:lstStyle/>
           <a:p>
@@ -7956,7 +7956,15 @@
             </a:br>
             <a:r>
               <a:rPr lang="en-US" sz="10300" dirty="0" smtClean="0"/>
-              <a:t>How do bus cuts affect congestion &amp; coverage?</a:t>
+              <a:t>How do bus cuts affect </a:t>
+            </a:r>
+            <a:r>
+              <a:rPr lang="en-US" sz="10300" dirty="0" smtClean="0"/>
+              <a:t>congestion </a:t>
+            </a:r>
+            <a:r>
+              <a:rPr lang="en-US" sz="10300" dirty="0" smtClean="0"/>
+              <a:t>&amp; coverage?</a:t>
             </a:r>
             <a:br>
               <a:rPr lang="en-US" sz="10300" dirty="0" smtClean="0"/>
@@ -7979,14 +7987,14 @@
         </p:nvSpPr>
         <p:spPr>
           <a:xfrm>
-            <a:off x="904240" y="18695438"/>
-            <a:ext cx="13553440" cy="10875264"/>
+            <a:off x="650240" y="20636429"/>
+            <a:ext cx="9966960" cy="9811822"/>
           </a:xfrm>
           <a:prstGeom prst="rect">
             <a:avLst/>
           </a:prstGeom>
           <a:solidFill>
-            <a:schemeClr val="accent1"/>
+            <a:schemeClr val="accent4"/>
           </a:solidFill>
           <a:ln>
             <a:noFill/>
@@ -8009,45 +8017,121 @@
           </a:fontRef>
         </p:style>
         <p:txBody>
-          <a:bodyPr lIns="376202" tIns="188101" rIns="376202" bIns="188101" rtlCol="0" anchor="ctr"/>
-          <a:lstStyle/>
+          <a:bodyPr lIns="376202" tIns="188101" rIns="376202" bIns="188101" rtlCol="0" anchor="t"/>
+          <a:lstStyle/>
+          <a:p>
+            <a:endParaRPr lang="en-US" sz="2400" dirty="0" smtClean="0"/>
+          </a:p>
           <a:p>
             <a:pPr algn="ctr"/>
             <a:r>
-              <a:rPr lang="en-US" smtClean="0"/>
-              <a:t>Short d</a:t>
-            </a:r>
-            <a:r>
-              <a:rPr lang="en-US" smtClean="0"/>
-              <a:t>escription </a:t>
-            </a:r>
-            <a:r>
-              <a:rPr lang="en-US" dirty="0" smtClean="0"/>
-              <a:t>&amp; Results of “study”</a:t>
+              <a:rPr lang="en-US" b="1" dirty="0" smtClean="0"/>
+              <a:t>User Study</a:t>
             </a:r>
           </a:p>
           <a:p>
             <a:pPr algn="ctr"/>
-            <a:endParaRPr dirty="0"/>
-          </a:p>
-        </p:txBody>
-      </p:sp>
-      <p:sp>
-        <p:nvSpPr>
-          <p:cNvPr id="9" name="Rectangle 8"/>
+            <a:endParaRPr lang="en-US" sz="2400" dirty="0"/>
+          </a:p>
+          <a:p>
+            <a:pPr marL="685800" indent="-685800">
+              <a:buFont typeface="Arial"/>
+              <a:buChar char="•"/>
+            </a:pPr>
+            <a:r>
+              <a:rPr lang="en-US" sz="4800" dirty="0" smtClean="0"/>
+              <a:t>Semi-structured interviews</a:t>
+            </a:r>
+          </a:p>
+          <a:p>
+            <a:pPr marL="685800" indent="-685800">
+              <a:buFont typeface="Arial"/>
+              <a:buChar char="•"/>
+            </a:pPr>
+            <a:r>
+              <a:rPr lang="en-US" sz="4800" dirty="0" smtClean="0"/>
+              <a:t>8 participants (4 male, 4 female; including Seattle transit experts &amp; transit users)</a:t>
+            </a:r>
+          </a:p>
+          <a:p>
+            <a:pPr marL="685800" indent="-685800">
+              <a:buFont typeface="Arial"/>
+              <a:buChar char="•"/>
+            </a:pPr>
+            <a:r>
+              <a:rPr lang="en-US" sz="4800" dirty="0" smtClean="0"/>
+              <a:t>Feedback on prototype: </a:t>
+            </a:r>
+          </a:p>
+          <a:p>
+            <a:pPr marL="2566812" lvl="1" indent="-685800">
+              <a:buFont typeface="Arial"/>
+              <a:buChar char="•"/>
+            </a:pPr>
+            <a:r>
+              <a:rPr lang="en-US" sz="4800" dirty="0" smtClean="0"/>
+              <a:t>Relevance</a:t>
+            </a:r>
+          </a:p>
+          <a:p>
+            <a:pPr marL="2566812" lvl="1" indent="-685800">
+              <a:buFont typeface="Arial"/>
+              <a:buChar char="•"/>
+            </a:pPr>
+            <a:r>
+              <a:rPr lang="en-US" sz="4800" dirty="0" smtClean="0"/>
+              <a:t>Interactive features</a:t>
+            </a:r>
+          </a:p>
+          <a:p>
+            <a:pPr marL="2566812" lvl="1" indent="-685800">
+              <a:buFont typeface="Arial"/>
+              <a:buChar char="•"/>
+            </a:pPr>
+            <a:r>
+              <a:rPr lang="en-US" sz="4800" dirty="0" smtClean="0"/>
+              <a:t>Color choices</a:t>
+            </a:r>
+          </a:p>
+          <a:p>
+            <a:pPr marL="2566812" lvl="1" indent="-685800">
+              <a:buFont typeface="Arial"/>
+              <a:buChar char="•"/>
+            </a:pPr>
+            <a:r>
+              <a:rPr lang="en-US" sz="4800" dirty="0" smtClean="0"/>
+              <a:t>General usability</a:t>
+            </a:r>
+          </a:p>
+          <a:p>
+            <a:pPr marL="685800" indent="-685800">
+              <a:buFont typeface="Arial"/>
+              <a:buChar char="•"/>
+            </a:pPr>
+            <a:r>
+              <a:rPr lang="en-US" sz="4800" dirty="0" smtClean="0"/>
+              <a:t>Desired functionality</a:t>
+            </a:r>
+            <a:endParaRPr lang="en-US" sz="4800" dirty="0"/>
+          </a:p>
+        </p:txBody>
+      </p:sp>
+      <p:sp>
+        <p:nvSpPr>
+          <p:cNvPr id="10" name="Rectangle 9"/>
           <p:cNvSpPr/>
           <p:nvPr/>
         </p:nvSpPr>
         <p:spPr>
           <a:xfrm>
-            <a:off x="21767802" y="7282191"/>
-            <a:ext cx="6583680" cy="10875264"/>
+            <a:off x="14487938" y="4005591"/>
+            <a:ext cx="13997434" cy="4014224"/>
           </a:xfrm>
           <a:prstGeom prst="rect">
             <a:avLst/>
           </a:prstGeom>
           <a:solidFill>
-            <a:schemeClr val="accent3"/>
+            <a:schemeClr val="accent6"/>
           </a:solidFill>
           <a:ln>
             <a:noFill/>
@@ -8074,26 +8158,70 @@
           <a:lstStyle/>
           <a:p>
             <a:pPr algn="ctr"/>
-            <a:endParaRPr dirty="0"/>
-          </a:p>
-        </p:txBody>
-      </p:sp>
-      <p:sp>
-        <p:nvSpPr>
-          <p:cNvPr id="10" name="Rectangle 9"/>
+            <a:r>
+              <a:rPr lang="en-US" sz="5400" dirty="0"/>
+              <a:t>"The easiest way to understand the cuts is to look at our Sunday schedule. It would be like Sunday schedule, but every </a:t>
+            </a:r>
+            <a:r>
+              <a:rPr lang="en-US" sz="5400" dirty="0" smtClean="0"/>
+              <a:t>day</a:t>
+            </a:r>
+            <a:r>
+              <a:rPr lang="en-US" sz="5400" dirty="0" smtClean="0"/>
+              <a:t>” </a:t>
+            </a:r>
+            <a:endParaRPr lang="en-US" sz="2000" dirty="0" smtClean="0"/>
+          </a:p>
+          <a:p>
+            <a:pPr algn="ctr"/>
+            <a:r>
+              <a:rPr lang="en-US" sz="5400" i="1" kern="1200" dirty="0" smtClean="0">
+                <a:solidFill>
+                  <a:schemeClr val="lt1"/>
+                </a:solidFill>
+              </a:rPr>
+              <a:t> </a:t>
+            </a:r>
+            <a:r>
+              <a:rPr lang="en-US" sz="4800" i="1" kern="1200" dirty="0" smtClean="0">
+                <a:solidFill>
+                  <a:schemeClr val="lt1"/>
+                </a:solidFill>
+              </a:rPr>
+              <a:t>Seattle </a:t>
+            </a:r>
+            <a:r>
+              <a:rPr lang="en-US" sz="4800" i="1" kern="1200" dirty="0" smtClean="0">
+                <a:solidFill>
+                  <a:schemeClr val="lt1"/>
+                </a:solidFill>
+              </a:rPr>
+              <a:t>bus driver, route 31</a:t>
+            </a:r>
+            <a:endParaRPr sz="4800" i="1" kern="1200" dirty="0">
+              <a:solidFill>
+                <a:schemeClr val="lt1"/>
+              </a:solidFill>
+            </a:endParaRPr>
+          </a:p>
+        </p:txBody>
+      </p:sp>
+      <p:sp>
+        <p:nvSpPr>
+          <p:cNvPr id="12" name="Rectangle 11"/>
           <p:cNvSpPr/>
           <p:nvPr/>
         </p:nvSpPr>
         <p:spPr>
           <a:xfrm>
-            <a:off x="14798042" y="18695438"/>
-            <a:ext cx="6583680" cy="10875264"/>
+            <a:off x="16829044" y="30808138"/>
+            <a:ext cx="11656328" cy="5308490"/>
           </a:xfrm>
           <a:prstGeom prst="rect">
             <a:avLst/>
           </a:prstGeom>
           <a:solidFill>
-            <a:schemeClr val="accent4"/>
+            <a:schemeClr val="accent2"/>
           </a:solidFill>
           <a:ln>
             <a:noFill/>
@@ -8121,52 +8249,61 @@
           <a:p>
             <a:pPr algn="ctr"/>
             <a:r>
-              <a:rPr lang="en-US" sz="5400" dirty="0"/>
-              <a:t>"The easiest way to understand the cuts is to look at our Sunday schedule. It would be like Sunday schedule, but every </a:t>
-            </a:r>
-            <a:r>
-              <a:rPr lang="en-US" sz="5400" dirty="0" smtClean="0"/>
-              <a:t>day”</a:t>
+              <a:rPr lang="en-US" sz="6600" b="1" dirty="0" smtClean="0"/>
+              <a:t>Will Upcoming Transit Cuts Affect You?</a:t>
             </a:r>
           </a:p>
           <a:p>
             <a:pPr algn="ctr"/>
-            <a:endParaRPr lang="en-US" sz="5400" dirty="0" smtClean="0"/>
+            <a:endParaRPr lang="en-US" sz="2400" b="1" dirty="0" smtClean="0"/>
           </a:p>
           <a:p>
             <a:pPr algn="ctr"/>
             <a:r>
-              <a:rPr lang="en-US" sz="4800" i="1" kern="1200" dirty="0" smtClean="0">
-                <a:solidFill>
-                  <a:schemeClr val="lt1"/>
-                </a:solidFill>
+              <a:rPr lang="en-US" sz="4800" dirty="0" smtClean="0"/>
+              <a:t>Metro proposes 17% service cut</a:t>
+            </a:r>
+          </a:p>
+          <a:p>
+            <a:pPr algn="ctr"/>
+            <a:r>
+              <a:rPr lang="en-US" sz="4800" dirty="0" smtClean="0">
+                <a:hlinkClick r:id="rId2"/>
               </a:rPr>
-              <a:t>Seattle bus driver, route 31</a:t>
-            </a:r>
-            <a:endParaRPr sz="4800" i="1" kern="1200" dirty="0">
-              <a:solidFill>
-                <a:schemeClr val="lt1"/>
-              </a:solidFill>
-            </a:endParaRPr>
-          </a:p>
-        </p:txBody>
-      </p:sp>
-      <p:sp>
-        <p:nvSpPr>
-          <p:cNvPr id="11" name="Rectangle 10"/>
+              <a:t>http</a:t>
+            </a:r>
+            <a:r>
+              <a:rPr lang="en-US" sz="4800" dirty="0">
+                <a:hlinkClick r:id="rId2"/>
+              </a:rPr>
+              <a:t>://metro.kingcounty.gov/am/future</a:t>
+            </a:r>
+            <a:r>
+              <a:rPr lang="en-US" sz="4800" dirty="0" smtClean="0">
+                <a:hlinkClick r:id="rId2"/>
+              </a:rPr>
+              <a:t>/</a:t>
+            </a:r>
+            <a:endParaRPr sz="4800" dirty="0"/>
+          </a:p>
+        </p:txBody>
+      </p:sp>
+      <p:sp>
+        <p:nvSpPr>
+          <p:cNvPr id="13" name="Rectangle 12"/>
           <p:cNvSpPr/>
           <p:nvPr/>
         </p:nvSpPr>
         <p:spPr>
           <a:xfrm>
-            <a:off x="14798042" y="7282191"/>
-            <a:ext cx="6583680" cy="10875264"/>
+            <a:off x="650240" y="4005591"/>
+            <a:ext cx="13553440" cy="9278609"/>
           </a:xfrm>
           <a:prstGeom prst="rect">
             <a:avLst/>
           </a:prstGeom>
           <a:solidFill>
-            <a:schemeClr val="accent6"/>
+            <a:schemeClr val="accent1"/>
           </a:solidFill>
           <a:ln>
             <a:noFill/>
@@ -8189,34 +8326,394 @@
           </a:fontRef>
         </p:style>
         <p:txBody>
-          <a:bodyPr lIns="376202" tIns="188101" rIns="376202" bIns="188101" rtlCol="0" anchor="ctr"/>
+          <a:bodyPr lIns="376202" tIns="188101" rIns="376202" bIns="188101" rtlCol="0" anchor="t"/>
           <a:lstStyle/>
           <a:p>
             <a:pPr algn="ctr"/>
-            <a:r>
-              <a:rPr lang="en-US" dirty="0" smtClean="0"/>
-              <a:t>Description of the data &amp; previous bus cuts</a:t>
-            </a:r>
-            <a:endParaRPr dirty="0"/>
-          </a:p>
-        </p:txBody>
-      </p:sp>
-      <p:sp>
-        <p:nvSpPr>
-          <p:cNvPr id="12" name="Rectangle 11"/>
+            <a:endParaRPr lang="en-US" sz="2400" b="1" dirty="0" smtClean="0">
+              <a:solidFill>
+                <a:schemeClr val="bg1"/>
+              </a:solidFill>
+            </a:endParaRPr>
+          </a:p>
+          <a:p>
+            <a:pPr algn="ctr"/>
+            <a:r>
+              <a:rPr lang="en-US" sz="6600" b="1" dirty="0" smtClean="0">
+                <a:solidFill>
+                  <a:schemeClr val="bg1"/>
+                </a:solidFill>
+              </a:rPr>
+              <a:t>Problem &amp; Motivation</a:t>
+            </a:r>
+          </a:p>
+          <a:p>
+            <a:pPr algn="ctr"/>
+            <a:endParaRPr lang="en-US" sz="2400" dirty="0" smtClean="0">
+              <a:solidFill>
+                <a:schemeClr val="accent6"/>
+              </a:solidFill>
+            </a:endParaRPr>
+          </a:p>
+          <a:p>
+            <a:pPr algn="ctr"/>
+            <a:r>
+              <a:rPr lang="en-US" sz="4800" dirty="0" smtClean="0">
+                <a:solidFill>
+                  <a:schemeClr val="accent6"/>
+                </a:solidFill>
+              </a:rPr>
+              <a:t>Cuts and changes </a:t>
+            </a:r>
+            <a:r>
+              <a:rPr lang="en-US" sz="4800" dirty="0" smtClean="0"/>
+              <a:t>to bus routes and schedules have complicated effects on quality of bus service across large areas and on bus delays and road congestion. </a:t>
+            </a:r>
+          </a:p>
+          <a:p>
+            <a:pPr algn="ctr"/>
+            <a:endParaRPr lang="en-US" sz="2400" dirty="0"/>
+          </a:p>
+          <a:p>
+            <a:pPr algn="ctr"/>
+            <a:r>
+              <a:rPr lang="en-US" sz="4800" dirty="0" smtClean="0"/>
+              <a:t>It is useful to leverage </a:t>
+            </a:r>
+            <a:r>
+              <a:rPr lang="en-US" sz="4800" dirty="0" smtClean="0">
+                <a:solidFill>
+                  <a:srgbClr val="A3A101"/>
+                </a:solidFill>
+              </a:rPr>
+              <a:t>historical data </a:t>
+            </a:r>
+            <a:r>
+              <a:rPr lang="en-US" sz="4800" dirty="0" smtClean="0"/>
+              <a:t>to demonstrate how </a:t>
+            </a:r>
+            <a:r>
+              <a:rPr lang="en-US" sz="4800" dirty="0" smtClean="0">
+                <a:solidFill>
+                  <a:srgbClr val="A3A101"/>
+                </a:solidFill>
+              </a:rPr>
+              <a:t>congestion</a:t>
+            </a:r>
+            <a:r>
+              <a:rPr lang="en-US" sz="4800" dirty="0" smtClean="0"/>
+              <a:t> and </a:t>
+            </a:r>
+            <a:r>
+              <a:rPr lang="en-US" sz="4800" dirty="0" smtClean="0">
+                <a:solidFill>
+                  <a:srgbClr val="A3A101"/>
+                </a:solidFill>
+              </a:rPr>
+              <a:t>coverage</a:t>
+            </a:r>
+            <a:r>
+              <a:rPr lang="en-US" sz="4800" dirty="0" smtClean="0"/>
+              <a:t> changed as the result of route changes. This could help </a:t>
+            </a:r>
+            <a:r>
+              <a:rPr lang="en-US" sz="4800" dirty="0" smtClean="0">
+                <a:solidFill>
+                  <a:srgbClr val="A3A101"/>
+                </a:solidFill>
+              </a:rPr>
+              <a:t>inform future transit policy decisions</a:t>
+            </a:r>
+            <a:r>
+              <a:rPr lang="en-US" sz="4800" dirty="0" smtClean="0"/>
+              <a:t>. </a:t>
+            </a:r>
+          </a:p>
+        </p:txBody>
+      </p:sp>
+      <p:pic>
+        <p:nvPicPr>
+          <p:cNvPr id="14" name="Picture 13"/>
+          <p:cNvPicPr>
+            <a:picLocks noChangeAspect="1"/>
+          </p:cNvPicPr>
+          <p:nvPr/>
+        </p:nvPicPr>
+        <p:blipFill>
+          <a:blip r:embed="rId3"/>
+          <a:stretch>
+            <a:fillRect/>
+          </a:stretch>
+        </p:blipFill>
+        <p:spPr>
+          <a:xfrm>
+            <a:off x="13828080" y="33640127"/>
+            <a:ext cx="2501900" cy="2501900"/>
+          </a:xfrm>
+          <a:prstGeom prst="rect">
+            <a:avLst/>
+          </a:prstGeom>
+        </p:spPr>
+      </p:pic>
+      <p:pic>
+        <p:nvPicPr>
+          <p:cNvPr id="16" name="Picture 15"/>
+          <p:cNvPicPr>
+            <a:picLocks noChangeAspect="1"/>
+          </p:cNvPicPr>
+          <p:nvPr/>
+        </p:nvPicPr>
+        <p:blipFill>
+          <a:blip r:embed="rId4"/>
+          <a:stretch>
+            <a:fillRect/>
+          </a:stretch>
+        </p:blipFill>
+        <p:spPr>
+          <a:xfrm>
+            <a:off x="10617200" y="33640127"/>
+            <a:ext cx="2467474" cy="2501900"/>
+          </a:xfrm>
+          <a:prstGeom prst="rect">
+            <a:avLst/>
+          </a:prstGeom>
+        </p:spPr>
+      </p:pic>
+      <p:pic>
+        <p:nvPicPr>
+          <p:cNvPr id="18" name="Picture 17"/>
+          <p:cNvPicPr>
+            <a:picLocks noChangeAspect="1"/>
+          </p:cNvPicPr>
+          <p:nvPr/>
+        </p:nvPicPr>
+        <p:blipFill>
+          <a:blip r:embed="rId5"/>
+          <a:stretch>
+            <a:fillRect/>
+          </a:stretch>
+        </p:blipFill>
+        <p:spPr>
+          <a:xfrm>
+            <a:off x="11537142" y="31136193"/>
+            <a:ext cx="4246242" cy="2089151"/>
+          </a:xfrm>
+          <a:prstGeom prst="rect">
+            <a:avLst/>
+          </a:prstGeom>
+        </p:spPr>
+      </p:pic>
+      <p:sp>
+        <p:nvSpPr>
+          <p:cNvPr id="23" name="Rectangle 22"/>
           <p:cNvSpPr/>
           <p:nvPr/>
         </p:nvSpPr>
         <p:spPr>
           <a:xfrm>
-            <a:off x="21767802" y="18695438"/>
-            <a:ext cx="6583680" cy="10875264"/>
+            <a:off x="384674" y="33835008"/>
+            <a:ext cx="9966960" cy="2554545"/>
+          </a:xfrm>
+          <a:prstGeom prst="rect">
+            <a:avLst/>
+          </a:prstGeom>
+        </p:spPr>
+        <p:txBody>
+          <a:bodyPr wrap="square">
+            <a:spAutoFit/>
+          </a:bodyPr>
+          <a:lstStyle/>
+          <a:p>
+            <a:pPr algn="ctr"/>
+            <a:r>
+              <a:rPr lang="en-US" sz="4000" b="1" dirty="0" smtClean="0"/>
+              <a:t>Camille Cobb, Caitlin </a:t>
+            </a:r>
+            <a:r>
+              <a:rPr lang="en-US" sz="4000" b="1" dirty="0" err="1" smtClean="0"/>
+              <a:t>Bonnar</a:t>
+            </a:r>
+            <a:r>
+              <a:rPr lang="en-US" sz="4000" b="1" dirty="0" smtClean="0"/>
+              <a:t>, </a:t>
+            </a:r>
+          </a:p>
+          <a:p>
+            <a:pPr algn="ctr"/>
+            <a:r>
+              <a:rPr lang="en-US" sz="4000" b="1" dirty="0" smtClean="0"/>
+              <a:t>Yi Pan, Katie </a:t>
+            </a:r>
+            <a:r>
+              <a:rPr lang="en-US" sz="4000" b="1" dirty="0" err="1" smtClean="0"/>
+              <a:t>Kuksenok</a:t>
+            </a:r>
+            <a:r>
+              <a:rPr lang="en-US" sz="4000" b="1" dirty="0" smtClean="0"/>
+              <a:t> </a:t>
+            </a:r>
+          </a:p>
+          <a:p>
+            <a:pPr algn="ctr"/>
+            <a:r>
+              <a:rPr lang="en-US" sz="4000" dirty="0" smtClean="0"/>
+              <a:t>{</a:t>
+            </a:r>
+            <a:r>
+              <a:rPr lang="en-US" sz="4000" dirty="0" smtClean="0"/>
+              <a:t>cobbc12, </a:t>
+            </a:r>
+            <a:r>
+              <a:rPr lang="en-US" sz="4000" dirty="0" err="1" smtClean="0"/>
+              <a:t>cbonnar</a:t>
+            </a:r>
+            <a:r>
+              <a:rPr lang="en-US" sz="4000" dirty="0" smtClean="0"/>
+              <a:t>, pany5, </a:t>
+            </a:r>
+            <a:r>
+              <a:rPr lang="en-US" sz="4000" dirty="0" err="1" smtClean="0"/>
+              <a:t>kuksenok</a:t>
+            </a:r>
+            <a:r>
+              <a:rPr lang="en-US" sz="4000" dirty="0" smtClean="0"/>
+              <a:t>}</a:t>
+            </a:r>
+          </a:p>
+          <a:p>
+            <a:pPr algn="ctr"/>
+            <a:r>
+              <a:rPr lang="en-US" sz="4000" dirty="0" smtClean="0"/>
+              <a:t>@</a:t>
+            </a:r>
+            <a:r>
+              <a:rPr lang="en-US" sz="4000" dirty="0" err="1" smtClean="0"/>
+              <a:t>cs.washington.edu</a:t>
+            </a:r>
+            <a:endParaRPr lang="en-US" sz="4000" dirty="0" smtClean="0"/>
+          </a:p>
+        </p:txBody>
+      </p:sp>
+      <p:sp>
+        <p:nvSpPr>
+          <p:cNvPr id="25" name="Rectangle 24"/>
+          <p:cNvSpPr/>
+          <p:nvPr/>
+        </p:nvSpPr>
+        <p:spPr>
+          <a:xfrm>
+            <a:off x="650240" y="30808138"/>
+            <a:ext cx="9916160" cy="4185762"/>
+          </a:xfrm>
+          <a:prstGeom prst="rect">
+            <a:avLst/>
+          </a:prstGeom>
+        </p:spPr>
+        <p:txBody>
+          <a:bodyPr wrap="square">
+            <a:spAutoFit/>
+          </a:bodyPr>
+          <a:lstStyle/>
+          <a:p>
+            <a:pPr algn="ctr"/>
+            <a:r>
+              <a:rPr lang="en-US" sz="4800" dirty="0"/>
+              <a:t>CSE 512 Final </a:t>
+            </a:r>
+            <a:r>
+              <a:rPr lang="en-US" sz="4800" dirty="0" smtClean="0"/>
+              <a:t>Project</a:t>
+            </a:r>
+            <a:endParaRPr lang="en-US" sz="2400" dirty="0" smtClean="0">
+              <a:hlinkClick r:id="rId6"/>
+            </a:endParaRPr>
+          </a:p>
+          <a:p>
+            <a:pPr algn="ctr"/>
+            <a:endParaRPr lang="en-US" sz="1000" dirty="0" smtClean="0">
+              <a:hlinkClick r:id="rId6"/>
+            </a:endParaRPr>
+          </a:p>
+          <a:p>
+            <a:pPr algn="ctr"/>
+            <a:r>
+              <a:rPr lang="en-US" sz="3000" dirty="0" smtClean="0">
+                <a:hlinkClick r:id="rId6"/>
+              </a:rPr>
+              <a:t>https</a:t>
+            </a:r>
+            <a:r>
+              <a:rPr lang="en-US" sz="3000" dirty="0">
+                <a:hlinkClick r:id="rId6"/>
+              </a:rPr>
+              <a:t>://github.com/CSE512-14W/fp-cobbc12-cbonnar-pany5-</a:t>
+            </a:r>
+            <a:r>
+              <a:rPr lang="en-US" sz="3000" dirty="0" smtClean="0">
+                <a:hlinkClick r:id="rId6"/>
+              </a:rPr>
+              <a:t>kuksenok</a:t>
+            </a:r>
+            <a:endParaRPr lang="en-US" sz="3000" dirty="0" smtClean="0"/>
+          </a:p>
+          <a:p>
+            <a:pPr algn="ctr"/>
+            <a:endParaRPr lang="en-US" sz="1000" dirty="0" smtClean="0">
+              <a:hlinkClick r:id="rId7"/>
+            </a:endParaRPr>
+          </a:p>
+          <a:p>
+            <a:pPr algn="ctr"/>
+            <a:r>
+              <a:rPr lang="en-US" sz="3000" dirty="0" smtClean="0">
+                <a:hlinkClick r:id="rId7"/>
+              </a:rPr>
+              <a:t>http</a:t>
+            </a:r>
+            <a:r>
+              <a:rPr lang="en-US" sz="3000" dirty="0">
+                <a:hlinkClick r:id="rId7"/>
+              </a:rPr>
+              <a:t>://homes.cs.washington.edu/~cbonnar/viz/</a:t>
+            </a:r>
+            <a:r>
+              <a:rPr lang="en-US" sz="3000" dirty="0" smtClean="0">
+                <a:hlinkClick r:id="rId7"/>
+              </a:rPr>
+              <a:t>ibusviz.html</a:t>
+            </a:r>
+            <a:endParaRPr lang="en-US" sz="3000" dirty="0" smtClean="0"/>
+          </a:p>
+          <a:p>
+            <a:pPr algn="ctr"/>
+            <a:endParaRPr lang="en-US" sz="3000" dirty="0" smtClean="0"/>
+          </a:p>
+          <a:p>
+            <a:pPr algn="ctr"/>
+            <a:r>
+              <a:rPr lang="en-US" sz="4800" dirty="0" smtClean="0"/>
+              <a:t> </a:t>
+            </a:r>
+            <a:endParaRPr lang="en-US" sz="4000" dirty="0"/>
+          </a:p>
+        </p:txBody>
+      </p:sp>
+      <p:sp>
+        <p:nvSpPr>
+          <p:cNvPr id="9" name="Rectangle 8"/>
+          <p:cNvSpPr/>
+          <p:nvPr/>
+        </p:nvSpPr>
+        <p:spPr>
+          <a:xfrm>
+            <a:off x="14487938" y="8303767"/>
+            <a:ext cx="13997434" cy="12074504"/>
           </a:xfrm>
           <a:prstGeom prst="rect">
             <a:avLst/>
           </a:prstGeom>
           <a:solidFill>
-            <a:schemeClr val="accent2"/>
+            <a:schemeClr val="accent3"/>
           </a:solidFill>
           <a:ln>
             <a:noFill/>
@@ -8239,49 +8736,608 @@
           </a:fontRef>
         </p:style>
         <p:txBody>
-          <a:bodyPr lIns="376202" tIns="188101" rIns="376202" bIns="188101" rtlCol="0" anchor="ctr"/>
+          <a:bodyPr lIns="376202" tIns="188101" rIns="376202" bIns="188101" rtlCol="0" anchor="t"/>
           <a:lstStyle/>
           <a:p>
             <a:pPr algn="ctr"/>
-            <a:r>
-              <a:rPr lang="en-US" dirty="0" smtClean="0"/>
-              <a:t>Info about upcoming cuts? </a:t>
-            </a:r>
+            <a:endParaRPr lang="en-US" sz="1600" b="1" dirty="0" smtClean="0"/>
           </a:p>
           <a:p>
             <a:pPr algn="ctr"/>
             <a:r>
-              <a:rPr lang="en-US" dirty="0">
-                <a:hlinkClick r:id="rId2"/>
-              </a:rPr>
-              <a:t>http://metro.kingcounty.gov/am/future</a:t>
-            </a:r>
-            <a:r>
-              <a:rPr lang="en-US" dirty="0" smtClean="0">
-                <a:hlinkClick r:id="rId2"/>
-              </a:rPr>
-              <a:t>/</a:t>
-            </a:r>
-            <a:endParaRPr dirty="0"/>
-          </a:p>
-        </p:txBody>
-      </p:sp>
-      <p:sp>
-        <p:nvSpPr>
-          <p:cNvPr id="13" name="Rectangle 12"/>
+              <a:rPr lang="en-US" sz="6600" b="1" dirty="0" smtClean="0"/>
+              <a:t>Design Inspiration &amp; </a:t>
+            </a:r>
+          </a:p>
+          <a:p>
+            <a:pPr algn="ctr"/>
+            <a:r>
+              <a:rPr lang="en-US" sz="6600" b="1" dirty="0" smtClean="0"/>
+              <a:t>           Initial Prototypes</a:t>
+            </a:r>
+          </a:p>
+          <a:p>
+            <a:pPr algn="ctr"/>
+            <a:endParaRPr lang="en-US" sz="2400" b="1" dirty="0" smtClean="0"/>
+          </a:p>
+        </p:txBody>
+      </p:sp>
+      <p:grpSp>
+        <p:nvGrpSpPr>
+          <p:cNvPr id="84" name="Group 83"/>
+          <p:cNvGrpSpPr/>
+          <p:nvPr/>
+        </p:nvGrpSpPr>
+        <p:grpSpPr>
+          <a:xfrm>
+            <a:off x="15079030" y="10162157"/>
+            <a:ext cx="3339753" cy="2038318"/>
+            <a:chOff x="129980" y="-1382559"/>
+            <a:chExt cx="3339753" cy="2038318"/>
+          </a:xfrm>
+        </p:grpSpPr>
+        <p:pic>
+          <p:nvPicPr>
+            <p:cNvPr id="85" name="Picture 84"/>
+            <p:cNvPicPr>
+              <a:picLocks noChangeAspect="1"/>
+            </p:cNvPicPr>
+            <p:nvPr/>
+          </p:nvPicPr>
+          <p:blipFill>
+            <a:blip r:embed="rId8"/>
+            <a:stretch>
+              <a:fillRect/>
+            </a:stretch>
+          </p:blipFill>
+          <p:spPr>
+            <a:xfrm>
+              <a:off x="129980" y="-1356502"/>
+              <a:ext cx="3303461" cy="2012261"/>
+            </a:xfrm>
+            <a:prstGeom prst="rect">
+              <a:avLst/>
+            </a:prstGeom>
+          </p:spPr>
+        </p:pic>
+        <p:sp>
+          <p:nvSpPr>
+            <p:cNvPr id="86" name="TextBox 85"/>
+            <p:cNvSpPr txBox="1"/>
+            <p:nvPr/>
+          </p:nvSpPr>
+          <p:spPr>
+            <a:xfrm>
+              <a:off x="166273" y="-1382559"/>
+              <a:ext cx="3303460" cy="646331"/>
+            </a:xfrm>
+            <a:prstGeom prst="rect">
+              <a:avLst/>
+            </a:prstGeom>
+            <a:noFill/>
+          </p:spPr>
+          <p:txBody>
+            <a:bodyPr wrap="square" rtlCol="0">
+              <a:spAutoFit/>
+            </a:bodyPr>
+            <a:lstStyle/>
+            <a:p>
+              <a:pPr marL="0" marR="0" lvl="0" indent="0" defTabSz="914400" eaLnBrk="1" fontAlgn="auto" latinLnBrk="0" hangingPunct="1">
+                <a:lnSpc>
+                  <a:spcPct val="100000"/>
+                </a:lnSpc>
+                <a:spcBef>
+                  <a:spcPts val="0"/>
+                </a:spcBef>
+                <a:spcAft>
+                  <a:spcPts val="0"/>
+                </a:spcAft>
+                <a:buClrTx/>
+                <a:buSzTx/>
+                <a:buFontTx/>
+                <a:buNone/>
+                <a:tabLst/>
+                <a:defRPr/>
+              </a:pPr>
+              <a:r>
+                <a:rPr kumimoji="0" lang="en-US" sz="2000" b="0" i="0" u="none" strike="noStrike" kern="0" cap="none" spc="0" normalizeH="0" baseline="0" noProof="0" dirty="0" smtClean="0">
+                  <a:ln>
+                    <a:noFill/>
+                  </a:ln>
+                  <a:solidFill>
+                    <a:srgbClr val="FFFFFF"/>
+                  </a:solidFill>
+                  <a:effectLst/>
+                  <a:uLnTx/>
+                  <a:uFillTx/>
+                </a:rPr>
+                <a:t>All the Ships in the World </a:t>
+              </a:r>
+              <a:r>
+                <a:rPr kumimoji="0" lang="en-US" sz="1600" b="0" i="0" u="none" strike="noStrike" kern="0" cap="none" spc="0" normalizeH="0" baseline="0" noProof="0" dirty="0" smtClean="0">
+                  <a:ln>
+                    <a:noFill/>
+                  </a:ln>
+                  <a:solidFill>
+                    <a:srgbClr val="FFFFFF"/>
+                  </a:solidFill>
+                  <a:effectLst/>
+                  <a:uLnTx/>
+                  <a:uFillTx/>
+                </a:rPr>
+                <a:t>@ Google I/O 2013</a:t>
+              </a:r>
+              <a:endParaRPr kumimoji="0" lang="en-US" sz="1600" b="0" i="0" u="none" strike="noStrike" kern="0" cap="none" spc="0" normalizeH="0" baseline="0" noProof="0" dirty="0">
+                <a:ln>
+                  <a:noFill/>
+                </a:ln>
+                <a:solidFill>
+                  <a:srgbClr val="FFFFFF"/>
+                </a:solidFill>
+                <a:effectLst/>
+                <a:uLnTx/>
+                <a:uFillTx/>
+              </a:endParaRPr>
+            </a:p>
+          </p:txBody>
+        </p:sp>
+      </p:grpSp>
+      <p:grpSp>
+        <p:nvGrpSpPr>
+          <p:cNvPr id="92" name="Group 91"/>
+          <p:cNvGrpSpPr/>
+          <p:nvPr/>
+        </p:nvGrpSpPr>
+        <p:grpSpPr>
+          <a:xfrm>
+            <a:off x="17007840" y="11653885"/>
+            <a:ext cx="2917360" cy="2847417"/>
+            <a:chOff x="5029202" y="1602813"/>
+            <a:chExt cx="2917360" cy="2847417"/>
+          </a:xfrm>
+        </p:grpSpPr>
+        <p:pic>
+          <p:nvPicPr>
+            <p:cNvPr id="93" name="Picture 92"/>
+            <p:cNvPicPr>
+              <a:picLocks noChangeAspect="1"/>
+            </p:cNvPicPr>
+            <p:nvPr/>
+          </p:nvPicPr>
+          <p:blipFill rotWithShape="1">
+            <a:blip r:embed="rId9"/>
+            <a:srcRect r="32741"/>
+            <a:stretch/>
+          </p:blipFill>
+          <p:spPr>
+            <a:xfrm>
+              <a:off x="5029202" y="1602813"/>
+              <a:ext cx="2917360" cy="2847417"/>
+            </a:xfrm>
+            <a:prstGeom prst="rect">
+              <a:avLst/>
+            </a:prstGeom>
+          </p:spPr>
+        </p:pic>
+        <p:sp>
+          <p:nvSpPr>
+            <p:cNvPr id="94" name="TextBox 93"/>
+            <p:cNvSpPr txBox="1"/>
+            <p:nvPr/>
+          </p:nvSpPr>
+          <p:spPr>
+            <a:xfrm>
+              <a:off x="5736762" y="1698153"/>
+              <a:ext cx="2209800" cy="707886"/>
+            </a:xfrm>
+            <a:prstGeom prst="rect">
+              <a:avLst/>
+            </a:prstGeom>
+            <a:noFill/>
+          </p:spPr>
+          <p:txBody>
+            <a:bodyPr wrap="square" rtlCol="0">
+              <a:spAutoFit/>
+            </a:bodyPr>
+            <a:lstStyle/>
+            <a:p>
+              <a:pPr marL="0" marR="0" lvl="0" indent="0" algn="r" defTabSz="914400" eaLnBrk="1" fontAlgn="auto" latinLnBrk="0" hangingPunct="1">
+                <a:lnSpc>
+                  <a:spcPct val="100000"/>
+                </a:lnSpc>
+                <a:spcBef>
+                  <a:spcPts val="0"/>
+                </a:spcBef>
+                <a:spcAft>
+                  <a:spcPts val="0"/>
+                </a:spcAft>
+                <a:buClrTx/>
+                <a:buSzTx/>
+                <a:buFontTx/>
+                <a:buNone/>
+                <a:tabLst/>
+                <a:defRPr/>
+              </a:pPr>
+              <a:r>
+                <a:rPr kumimoji="0" lang="en-US" sz="2000" b="0" i="0" u="none" strike="noStrike" kern="0" cap="none" spc="0" normalizeH="0" baseline="0" noProof="0" dirty="0" smtClean="0">
+                  <a:ln>
+                    <a:noFill/>
+                  </a:ln>
+                  <a:solidFill>
+                    <a:sysClr val="windowText" lastClr="000000"/>
+                  </a:solidFill>
+                  <a:effectLst/>
+                  <a:uLnTx/>
+                  <a:uFillTx/>
+                </a:rPr>
+                <a:t>Taxi Heat Map NYC</a:t>
+              </a:r>
+              <a:endParaRPr kumimoji="0" lang="en-US" sz="2000" b="0" i="0" u="none" strike="noStrike" kern="0" cap="none" spc="0" normalizeH="0" baseline="0" noProof="0" dirty="0">
+                <a:ln>
+                  <a:noFill/>
+                </a:ln>
+                <a:solidFill>
+                  <a:sysClr val="windowText" lastClr="000000"/>
+                </a:solidFill>
+                <a:effectLst/>
+                <a:uLnTx/>
+                <a:uFillTx/>
+              </a:endParaRPr>
+            </a:p>
+          </p:txBody>
+        </p:sp>
+      </p:grpSp>
+      <p:grpSp>
+        <p:nvGrpSpPr>
+          <p:cNvPr id="96" name="Group 95"/>
+          <p:cNvGrpSpPr/>
+          <p:nvPr/>
+        </p:nvGrpSpPr>
+        <p:grpSpPr>
+          <a:xfrm>
+            <a:off x="14825028" y="14181167"/>
+            <a:ext cx="3593755" cy="2176975"/>
+            <a:chOff x="2524098" y="3446126"/>
+            <a:chExt cx="3284227" cy="1832001"/>
+          </a:xfrm>
+        </p:grpSpPr>
+        <p:pic>
+          <p:nvPicPr>
+            <p:cNvPr id="97" name="Picture 96"/>
+            <p:cNvPicPr>
+              <a:picLocks noChangeAspect="1"/>
+            </p:cNvPicPr>
+            <p:nvPr/>
+          </p:nvPicPr>
+          <p:blipFill>
+            <a:blip r:embed="rId10"/>
+            <a:stretch>
+              <a:fillRect/>
+            </a:stretch>
+          </p:blipFill>
+          <p:spPr>
+            <a:xfrm>
+              <a:off x="2528276" y="3446126"/>
+              <a:ext cx="3225620" cy="1832001"/>
+            </a:xfrm>
+            <a:prstGeom prst="rect">
+              <a:avLst/>
+            </a:prstGeom>
+          </p:spPr>
+        </p:pic>
+        <p:sp>
+          <p:nvSpPr>
+            <p:cNvPr id="98" name="TextBox 97"/>
+            <p:cNvSpPr txBox="1"/>
+            <p:nvPr/>
+          </p:nvSpPr>
+          <p:spPr>
+            <a:xfrm>
+              <a:off x="2524098" y="4540564"/>
+              <a:ext cx="3284227" cy="707886"/>
+            </a:xfrm>
+            <a:prstGeom prst="rect">
+              <a:avLst/>
+            </a:prstGeom>
+            <a:noFill/>
+          </p:spPr>
+          <p:txBody>
+            <a:bodyPr wrap="square" rtlCol="0">
+              <a:spAutoFit/>
+            </a:bodyPr>
+            <a:lstStyle/>
+            <a:p>
+              <a:pPr marL="0" marR="0" lvl="0" indent="0" defTabSz="914400" eaLnBrk="1" fontAlgn="auto" latinLnBrk="0" hangingPunct="1">
+                <a:lnSpc>
+                  <a:spcPct val="100000"/>
+                </a:lnSpc>
+                <a:spcBef>
+                  <a:spcPts val="0"/>
+                </a:spcBef>
+                <a:spcAft>
+                  <a:spcPts val="0"/>
+                </a:spcAft>
+                <a:buClrTx/>
+                <a:buSzTx/>
+                <a:buFontTx/>
+                <a:buNone/>
+                <a:tabLst/>
+                <a:defRPr/>
+              </a:pPr>
+              <a:r>
+                <a:rPr kumimoji="0" lang="en-US" sz="2000" b="0" i="0" u="none" strike="noStrike" kern="0" cap="none" spc="0" normalizeH="0" baseline="0" noProof="0" dirty="0" smtClean="0">
+                  <a:ln>
+                    <a:noFill/>
+                  </a:ln>
+                  <a:solidFill>
+                    <a:sysClr val="windowText" lastClr="000000"/>
+                  </a:solidFill>
+                  <a:effectLst/>
+                  <a:uLnTx/>
+                  <a:uFillTx/>
+                </a:rPr>
+                <a:t>Dots on the Bus: </a:t>
+              </a:r>
+            </a:p>
+            <a:p>
+              <a:pPr marL="0" marR="0" lvl="0" indent="0" defTabSz="914400" eaLnBrk="1" fontAlgn="auto" latinLnBrk="0" hangingPunct="1">
+                <a:lnSpc>
+                  <a:spcPct val="100000"/>
+                </a:lnSpc>
+                <a:spcBef>
+                  <a:spcPts val="0"/>
+                </a:spcBef>
+                <a:spcAft>
+                  <a:spcPts val="0"/>
+                </a:spcAft>
+                <a:buClrTx/>
+                <a:buSzTx/>
+                <a:buFontTx/>
+                <a:buNone/>
+                <a:tabLst/>
+                <a:defRPr/>
+              </a:pPr>
+              <a:r>
+                <a:rPr kumimoji="0" lang="en-US" sz="2000" b="0" i="0" u="none" strike="noStrike" kern="0" cap="none" spc="0" normalizeH="0" baseline="0" noProof="0" dirty="0" smtClean="0">
+                  <a:ln>
+                    <a:noFill/>
+                  </a:ln>
+                  <a:solidFill>
+                    <a:sysClr val="windowText" lastClr="000000"/>
+                  </a:solidFill>
+                  <a:effectLst/>
+                  <a:uLnTx/>
+                  <a:uFillTx/>
+                </a:rPr>
+                <a:t>San Francisco</a:t>
+              </a:r>
+              <a:endParaRPr kumimoji="0" lang="en-US" sz="2000" b="0" i="0" u="none" strike="noStrike" kern="0" cap="none" spc="0" normalizeH="0" baseline="0" noProof="0" dirty="0">
+                <a:ln>
+                  <a:noFill/>
+                </a:ln>
+                <a:solidFill>
+                  <a:sysClr val="windowText" lastClr="000000"/>
+                </a:solidFill>
+                <a:effectLst/>
+                <a:uLnTx/>
+                <a:uFillTx/>
+              </a:endParaRPr>
+            </a:p>
+          </p:txBody>
+        </p:sp>
+      </p:grpSp>
+      <p:sp>
+        <p:nvSpPr>
+          <p:cNvPr id="104" name="Freeform 103"/>
           <p:cNvSpPr/>
           <p:nvPr/>
         </p:nvSpPr>
         <p:spPr>
-          <a:xfrm>
-            <a:off x="904240" y="7282191"/>
-            <a:ext cx="13553440" cy="10875264"/>
+          <a:xfrm rot="235906">
+            <a:off x="15684327" y="9184578"/>
+            <a:ext cx="1314894" cy="1008318"/>
+          </a:xfrm>
+          <a:custGeom>
+            <a:avLst/>
+            <a:gdLst>
+              <a:gd name="connsiteX0" fmla="*/ 1501168 w 1501168"/>
+              <a:gd name="connsiteY0" fmla="*/ 51632 h 1437087"/>
+              <a:gd name="connsiteX1" fmla="*/ 138858 w 1501168"/>
+              <a:gd name="connsiteY1" fmla="*/ 167087 h 1437087"/>
+              <a:gd name="connsiteX2" fmla="*/ 115768 w 1501168"/>
+              <a:gd name="connsiteY2" fmla="*/ 1437087 h 1437087"/>
+            </a:gdLst>
+            <a:ahLst/>
+            <a:cxnLst>
+              <a:cxn ang="0">
+                <a:pos x="connsiteX0" y="connsiteY0"/>
+              </a:cxn>
+              <a:cxn ang="0">
+                <a:pos x="connsiteX1" y="connsiteY1"/>
+              </a:cxn>
+              <a:cxn ang="0">
+                <a:pos x="connsiteX2" y="connsiteY2"/>
+              </a:cxn>
+            </a:cxnLst>
+            <a:rect l="l" t="t" r="r" b="b"/>
+            <a:pathLst>
+              <a:path w="1501168" h="1437087">
+                <a:moveTo>
+                  <a:pt x="1501168" y="51632"/>
+                </a:moveTo>
+                <a:cubicBezTo>
+                  <a:pt x="935463" y="-6095"/>
+                  <a:pt x="369758" y="-63822"/>
+                  <a:pt x="138858" y="167087"/>
+                </a:cubicBezTo>
+                <a:cubicBezTo>
+                  <a:pt x="-92042" y="397996"/>
+                  <a:pt x="11863" y="917541"/>
+                  <a:pt x="115768" y="1437087"/>
+                </a:cubicBezTo>
+              </a:path>
+            </a:pathLst>
+          </a:custGeom>
+          <a:ln w="127000">
+            <a:solidFill>
+              <a:schemeClr val="accent6"/>
+            </a:solidFill>
+            <a:headEnd type="none"/>
+            <a:tailEnd type="triangle"/>
+          </a:ln>
+        </p:spPr>
+        <p:style>
+          <a:lnRef idx="2">
+            <a:schemeClr val="accent1"/>
+          </a:lnRef>
+          <a:fillRef idx="0">
+            <a:schemeClr val="accent1"/>
+          </a:fillRef>
+          <a:effectRef idx="1">
+            <a:schemeClr val="accent1"/>
+          </a:effectRef>
+          <a:fontRef idx="minor">
+            <a:schemeClr val="tx1"/>
+          </a:fontRef>
+        </p:style>
+        <p:txBody>
+          <a:bodyPr rtlCol="0" anchor="ctr"/>
+          <a:lstStyle/>
+          <a:p>
+            <a:pPr algn="ctr"/>
+            <a:endParaRPr lang="en-US"/>
+          </a:p>
+        </p:txBody>
+      </p:sp>
+      <p:sp>
+        <p:nvSpPr>
+          <p:cNvPr id="105" name="Freeform 104"/>
+          <p:cNvSpPr/>
+          <p:nvPr/>
+        </p:nvSpPr>
+        <p:spPr>
+          <a:xfrm rot="18214948">
+            <a:off x="20924485" y="10955955"/>
+            <a:ext cx="1387162" cy="1676240"/>
+          </a:xfrm>
+          <a:custGeom>
+            <a:avLst/>
+            <a:gdLst>
+              <a:gd name="connsiteX0" fmla="*/ 1501168 w 1501168"/>
+              <a:gd name="connsiteY0" fmla="*/ 51632 h 1437087"/>
+              <a:gd name="connsiteX1" fmla="*/ 138858 w 1501168"/>
+              <a:gd name="connsiteY1" fmla="*/ 167087 h 1437087"/>
+              <a:gd name="connsiteX2" fmla="*/ 115768 w 1501168"/>
+              <a:gd name="connsiteY2" fmla="*/ 1437087 h 1437087"/>
+            </a:gdLst>
+            <a:ahLst/>
+            <a:cxnLst>
+              <a:cxn ang="0">
+                <a:pos x="connsiteX0" y="connsiteY0"/>
+              </a:cxn>
+              <a:cxn ang="0">
+                <a:pos x="connsiteX1" y="connsiteY1"/>
+              </a:cxn>
+              <a:cxn ang="0">
+                <a:pos x="connsiteX2" y="connsiteY2"/>
+              </a:cxn>
+            </a:cxnLst>
+            <a:rect l="l" t="t" r="r" b="b"/>
+            <a:pathLst>
+              <a:path w="1501168" h="1437087">
+                <a:moveTo>
+                  <a:pt x="1501168" y="51632"/>
+                </a:moveTo>
+                <a:cubicBezTo>
+                  <a:pt x="935463" y="-6095"/>
+                  <a:pt x="369758" y="-63822"/>
+                  <a:pt x="138858" y="167087"/>
+                </a:cubicBezTo>
+                <a:cubicBezTo>
+                  <a:pt x="-92042" y="397996"/>
+                  <a:pt x="11863" y="917541"/>
+                  <a:pt x="115768" y="1437087"/>
+                </a:cubicBezTo>
+              </a:path>
+            </a:pathLst>
+          </a:custGeom>
+          <a:ln w="127000">
+            <a:solidFill>
+              <a:schemeClr val="accent6"/>
+            </a:solidFill>
+            <a:headEnd type="none"/>
+            <a:tailEnd type="triangle"/>
+          </a:ln>
+        </p:spPr>
+        <p:style>
+          <a:lnRef idx="2">
+            <a:schemeClr val="accent1"/>
+          </a:lnRef>
+          <a:fillRef idx="0">
+            <a:schemeClr val="accent1"/>
+          </a:fillRef>
+          <a:effectRef idx="1">
+            <a:schemeClr val="accent1"/>
+          </a:effectRef>
+          <a:fontRef idx="minor">
+            <a:schemeClr val="tx1"/>
+          </a:fontRef>
+        </p:style>
+        <p:txBody>
+          <a:bodyPr rtlCol="0" anchor="ctr"/>
+          <a:lstStyle/>
+          <a:p>
+            <a:pPr algn="ctr"/>
+            <a:endParaRPr lang="en-US"/>
+          </a:p>
+        </p:txBody>
+      </p:sp>
+      <p:pic>
+        <p:nvPicPr>
+          <p:cNvPr id="114" name="Picture 113" descr="OriginalIdea copy.png"/>
+          <p:cNvPicPr>
+            <a:picLocks noChangeAspect="1"/>
+          </p:cNvPicPr>
+          <p:nvPr/>
+        </p:nvPicPr>
+        <p:blipFill>
+          <a:blip r:embed="rId11">
+            <a:extLst>
+              <a:ext uri="{28A0092B-C50C-407E-A947-70E740481C1C}">
+                <a14:useLocalDpi xmlns:a14="http://schemas.microsoft.com/office/drawing/2010/main" val="0"/>
+              </a:ext>
+            </a:extLst>
+          </a:blip>
+          <a:stretch>
+            <a:fillRect/>
+          </a:stretch>
+        </p:blipFill>
+        <p:spPr>
+          <a:xfrm>
+            <a:off x="18927549" y="15105114"/>
+            <a:ext cx="8357133" cy="5011686"/>
+          </a:xfrm>
+          <a:prstGeom prst="rect">
+            <a:avLst/>
+          </a:prstGeom>
+        </p:spPr>
+      </p:pic>
+      <p:sp>
+        <p:nvSpPr>
+          <p:cNvPr id="115" name="Rectangle 114"/>
+          <p:cNvSpPr/>
+          <p:nvPr/>
+        </p:nvSpPr>
+        <p:spPr>
+          <a:xfrm>
+            <a:off x="20231391" y="20636429"/>
+            <a:ext cx="8253981" cy="9811822"/>
           </a:xfrm>
           <a:prstGeom prst="rect">
             <a:avLst/>
           </a:prstGeom>
           <a:solidFill>
-            <a:schemeClr val="accent1"/>
+            <a:schemeClr val="accent6"/>
           </a:solidFill>
           <a:ln>
             <a:noFill/>
@@ -8304,274 +9360,377 @@
           </a:fontRef>
         </p:style>
         <p:txBody>
-          <a:bodyPr lIns="376202" tIns="188101" rIns="376202" bIns="188101" rtlCol="0" anchor="ctr"/>
-          <a:lstStyle/>
+          <a:bodyPr lIns="376202" tIns="188101" rIns="376202" bIns="188101" rtlCol="0" anchor="t"/>
+          <a:lstStyle/>
+          <a:p>
+            <a:endParaRPr lang="en-US" sz="2400" dirty="0" smtClean="0"/>
+          </a:p>
           <a:p>
             <a:pPr algn="ctr"/>
             <a:r>
-              <a:rPr lang="en-US" dirty="0" smtClean="0"/>
-              <a:t>Screenshot of our </a:t>
-            </a:r>
-            <a:r>
-              <a:rPr lang="en-US" dirty="0" err="1" smtClean="0"/>
-              <a:t>viz</a:t>
-            </a:r>
-            <a:endParaRPr dirty="0"/>
+              <a:rPr lang="en-US" sz="6600" b="1" dirty="0" smtClean="0"/>
+              <a:t>Future Directions</a:t>
+            </a:r>
+          </a:p>
+          <a:p>
+            <a:pPr algn="ctr"/>
+            <a:endParaRPr lang="en-US" sz="2400" b="1" dirty="0" smtClean="0"/>
+          </a:p>
+          <a:p>
+            <a:pPr marL="685800" indent="-685800">
+              <a:buFont typeface="Arial"/>
+              <a:buChar char="•"/>
+            </a:pPr>
+            <a:r>
+              <a:rPr lang="en-US" sz="4800" b="1" dirty="0" smtClean="0"/>
+              <a:t>More complete data collection</a:t>
+            </a:r>
+          </a:p>
+          <a:p>
+            <a:pPr marL="685800" indent="-685800">
+              <a:buFont typeface="Arial"/>
+              <a:buChar char="•"/>
+            </a:pPr>
+            <a:r>
+              <a:rPr lang="en-US" sz="4800" b="1" dirty="0" smtClean="0"/>
+              <a:t>Animation to show movement during time intervals</a:t>
+            </a:r>
+          </a:p>
+          <a:p>
+            <a:pPr marL="685800" indent="-685800">
+              <a:buFont typeface="Arial"/>
+              <a:buChar char="•"/>
+            </a:pPr>
+            <a:r>
+              <a:rPr lang="en-US" sz="4800" b="1" dirty="0" smtClean="0"/>
+              <a:t>Filter by route</a:t>
+            </a:r>
+          </a:p>
+          <a:p>
+            <a:pPr marL="685800" indent="-685800">
+              <a:buFont typeface="Arial"/>
+              <a:buChar char="•"/>
+            </a:pPr>
+            <a:r>
+              <a:rPr lang="en-US" sz="4800" b="1" dirty="0" smtClean="0"/>
+              <a:t>Show bus frequencies</a:t>
+            </a:r>
+          </a:p>
+          <a:p>
+            <a:pPr marL="685800" indent="-685800">
+              <a:buFont typeface="Arial"/>
+              <a:buChar char="•"/>
+            </a:pPr>
+            <a:r>
+              <a:rPr lang="en-US" sz="4800" b="1" dirty="0" smtClean="0"/>
+              <a:t>“Bus score” metrics</a:t>
+            </a:r>
+          </a:p>
+          <a:p>
+            <a:pPr marL="685800" indent="-685800">
+              <a:buFont typeface="Arial"/>
+              <a:buChar char="•"/>
+            </a:pPr>
+            <a:r>
+              <a:rPr lang="en-US" sz="4800" b="1" dirty="0" smtClean="0"/>
+              <a:t>Show multi-day averages</a:t>
+            </a:r>
+            <a:endParaRPr lang="en-US" sz="4800" b="1" dirty="0" smtClean="0"/>
+          </a:p>
+          <a:p>
+            <a:pPr marL="685800" indent="-685800">
+              <a:buFont typeface="Arial"/>
+              <a:buChar char="•"/>
+            </a:pPr>
+            <a:endParaRPr lang="en-US" sz="4800" b="1" dirty="0" smtClean="0"/>
+          </a:p>
+        </p:txBody>
+      </p:sp>
+      <p:sp>
+        <p:nvSpPr>
+          <p:cNvPr id="116" name="Rectangle 115"/>
+          <p:cNvSpPr/>
+          <p:nvPr/>
+        </p:nvSpPr>
+        <p:spPr>
+          <a:xfrm>
+            <a:off x="10905447" y="20636429"/>
+            <a:ext cx="9019753" cy="9811822"/>
+          </a:xfrm>
+          <a:prstGeom prst="rect">
+            <a:avLst/>
+          </a:prstGeom>
+          <a:solidFill>
+            <a:schemeClr val="accent1"/>
+          </a:solidFill>
+          <a:ln>
+            <a:noFill/>
+          </a:ln>
+        </p:spPr>
+        <p:style>
+          <a:lnRef idx="2">
+            <a:schemeClr val="accent1">
+              <a:shade val="50000"/>
+            </a:schemeClr>
+          </a:lnRef>
+          <a:fillRef idx="1">
+            <a:schemeClr val="accent1"/>
+          </a:fillRef>
+          <a:effectRef idx="0">
+            <a:schemeClr val="accent1"/>
+          </a:effectRef>
+          <a:fontRef idx="minor">
+            <a:schemeClr val="lt1"/>
+          </a:fontRef>
+        </p:style>
+        <p:txBody>
+          <a:bodyPr lIns="376202" tIns="188101" rIns="376202" bIns="188101" rtlCol="0" anchor="t"/>
+          <a:lstStyle/>
+          <a:p>
+            <a:endParaRPr lang="en-US" sz="2400" dirty="0" smtClean="0"/>
+          </a:p>
+          <a:p>
+            <a:pPr algn="ctr"/>
+            <a:r>
+              <a:rPr lang="en-US" sz="6600" b="1" dirty="0" smtClean="0"/>
+              <a:t>Design Improvements</a:t>
+            </a:r>
+          </a:p>
+          <a:p>
+            <a:pPr algn="ctr"/>
+            <a:endParaRPr lang="en-US" sz="2400" dirty="0"/>
+          </a:p>
+          <a:p>
+            <a:pPr marL="685800" indent="-685800">
+              <a:buFont typeface="Arial"/>
+              <a:buChar char="•"/>
+            </a:pPr>
+            <a:r>
+              <a:rPr lang="en-US" sz="4800" b="1" dirty="0" smtClean="0"/>
+              <a:t>Default to “day” </a:t>
+            </a:r>
+            <a:r>
+              <a:rPr lang="en-US" sz="4800" b="1" dirty="0" smtClean="0"/>
+              <a:t>view</a:t>
+            </a:r>
+          </a:p>
+          <a:p>
+            <a:pPr marL="685800" indent="-685800">
+              <a:buFont typeface="Arial"/>
+              <a:buChar char="•"/>
+            </a:pPr>
+            <a:r>
+              <a:rPr lang="en-US" sz="4800" b="1" dirty="0" smtClean="0"/>
+              <a:t>Make maps bigger</a:t>
+            </a:r>
+          </a:p>
+          <a:p>
+            <a:pPr marL="685800" indent="-685800">
+              <a:buFont typeface="Arial"/>
+              <a:buChar char="•"/>
+            </a:pPr>
+            <a:r>
+              <a:rPr lang="en-US" sz="4800" b="1" dirty="0" smtClean="0"/>
+              <a:t>Do not require click to st</a:t>
+            </a:r>
+            <a:r>
+              <a:rPr lang="en-US" sz="4800" b="1" dirty="0" smtClean="0"/>
+              <a:t>et time</a:t>
+            </a:r>
+          </a:p>
+          <a:p>
+            <a:pPr marL="685800" indent="-685800">
+              <a:buFont typeface="Arial"/>
+              <a:buChar char="•"/>
+            </a:pPr>
+            <a:r>
+              <a:rPr lang="en-US" sz="4800" b="1" dirty="0" smtClean="0"/>
+              <a:t>Ability to sync maps &amp; times</a:t>
+            </a:r>
+          </a:p>
+          <a:p>
+            <a:pPr marL="685800" indent="-685800">
+              <a:buFont typeface="Arial"/>
+              <a:buChar char="•"/>
+            </a:pPr>
+            <a:r>
+              <a:rPr lang="en-US" sz="4800" b="1" dirty="0" smtClean="0"/>
+              <a:t>Add legend</a:t>
+            </a:r>
+          </a:p>
+          <a:p>
+            <a:pPr marL="685800" indent="-685800">
+              <a:buFont typeface="Arial"/>
+              <a:buChar char="•"/>
+            </a:pPr>
+            <a:r>
+              <a:rPr lang="en-US" sz="4800" b="1" dirty="0" smtClean="0"/>
+              <a:t>Day selection by day of week</a:t>
+            </a:r>
+            <a:endParaRPr lang="en-US" sz="4800" b="1" dirty="0" smtClean="0"/>
+          </a:p>
+        </p:txBody>
+      </p:sp>
+      <p:sp>
+        <p:nvSpPr>
+          <p:cNvPr id="117" name="Rectangle 116"/>
+          <p:cNvSpPr/>
+          <p:nvPr/>
+        </p:nvSpPr>
+        <p:spPr>
+          <a:xfrm>
+            <a:off x="650240" y="13645686"/>
+            <a:ext cx="13553440" cy="6732585"/>
+          </a:xfrm>
+          <a:prstGeom prst="rect">
+            <a:avLst/>
+          </a:prstGeom>
+          <a:solidFill>
+            <a:schemeClr val="accent6"/>
+          </a:solidFill>
+          <a:ln>
+            <a:noFill/>
+          </a:ln>
+        </p:spPr>
+        <p:style>
+          <a:lnRef idx="2">
+            <a:schemeClr val="accent1">
+              <a:shade val="50000"/>
+            </a:schemeClr>
+          </a:lnRef>
+          <a:fillRef idx="1">
+            <a:schemeClr val="accent1"/>
+          </a:fillRef>
+          <a:effectRef idx="0">
+            <a:schemeClr val="accent1"/>
+          </a:effectRef>
+          <a:fontRef idx="minor">
+            <a:schemeClr val="lt1"/>
+          </a:fontRef>
+        </p:style>
+        <p:txBody>
+          <a:bodyPr lIns="376202" tIns="188101" rIns="376202" bIns="188101" rtlCol="0" anchor="t"/>
+          <a:lstStyle/>
+          <a:p>
+            <a:pPr algn="ctr"/>
+            <a:r>
+              <a:rPr lang="en-US" sz="4800" b="1" dirty="0">
+                <a:solidFill>
+                  <a:schemeClr val="bg1"/>
+                </a:solidFill>
+              </a:rPr>
+              <a:t> </a:t>
+            </a:r>
+            <a:r>
+              <a:rPr lang="en-US" sz="6600" b="1" dirty="0">
+                <a:solidFill>
+                  <a:schemeClr val="bg1"/>
+                </a:solidFill>
+              </a:rPr>
+              <a:t>Approach</a:t>
+            </a:r>
+          </a:p>
+          <a:p>
+            <a:endParaRPr lang="en-US" sz="2400" b="1" dirty="0">
+              <a:solidFill>
+                <a:schemeClr val="bg1"/>
+              </a:solidFill>
+            </a:endParaRPr>
+          </a:p>
+          <a:p>
+            <a:pPr marL="685800" indent="-685800">
+              <a:buFont typeface="Arial"/>
+              <a:buChar char="•"/>
+            </a:pPr>
+            <a:r>
+              <a:rPr lang="en-US" sz="4800" dirty="0">
+                <a:solidFill>
+                  <a:schemeClr val="bg1"/>
+                </a:solidFill>
+              </a:rPr>
+              <a:t>Focus on Feb 2012 transit change</a:t>
+            </a:r>
+          </a:p>
+          <a:p>
+            <a:pPr marL="685800" indent="-685800">
+              <a:buFont typeface="Arial"/>
+              <a:buChar char="•"/>
+            </a:pPr>
+            <a:r>
+              <a:rPr lang="en-US" sz="4800" dirty="0">
+                <a:solidFill>
+                  <a:schemeClr val="bg1"/>
+                </a:solidFill>
+              </a:rPr>
+              <a:t>Data from several pre-/post-change days</a:t>
+            </a:r>
+          </a:p>
+          <a:p>
+            <a:pPr marL="685800" indent="-685800">
+              <a:buFont typeface="Arial"/>
+              <a:buChar char="•"/>
+            </a:pPr>
+            <a:r>
+              <a:rPr lang="en-US" sz="4800" dirty="0">
+                <a:solidFill>
+                  <a:schemeClr val="bg1"/>
+                </a:solidFill>
+              </a:rPr>
+              <a:t>Two maps enable comparison for different days/times of day</a:t>
+            </a:r>
+          </a:p>
+          <a:p>
+            <a:pPr marL="685800" indent="-685800">
+              <a:buFont typeface="Arial"/>
+              <a:buChar char="•"/>
+            </a:pPr>
+            <a:r>
+              <a:rPr lang="en-US" sz="4800" dirty="0">
+                <a:solidFill>
+                  <a:schemeClr val="bg1"/>
+                </a:solidFill>
+              </a:rPr>
+              <a:t>Colored dots represent locations and delays of buses</a:t>
+            </a:r>
+            <a:endParaRPr lang="en-US" sz="4800" dirty="0" smtClean="0"/>
           </a:p>
         </p:txBody>
       </p:sp>
       <p:pic>
         <p:nvPicPr>
-          <p:cNvPr id="14" name="Picture 13"/>
+          <p:cNvPr id="118" name="Picture 117" descr="Slide7.png"/>
           <p:cNvPicPr>
             <a:picLocks noChangeAspect="1"/>
           </p:cNvPicPr>
           <p:nvPr/>
         </p:nvPicPr>
         <p:blipFill>
-          <a:blip r:embed="rId3"/>
+          <a:blip r:embed="rId12">
+            <a:extLst>
+              <a:ext uri="{28A0092B-C50C-407E-A947-70E740481C1C}">
+                <a14:useLocalDpi xmlns:a14="http://schemas.microsoft.com/office/drawing/2010/main" val="0"/>
+              </a:ext>
+            </a:extLst>
+          </a:blip>
           <a:stretch>
             <a:fillRect/>
           </a:stretch>
         </p:blipFill>
         <p:spPr>
           <a:xfrm>
-            <a:off x="25849582" y="33250744"/>
-            <a:ext cx="2501900" cy="2501900"/>
+            <a:off x="22191056" y="11203463"/>
+            <a:ext cx="5975239" cy="4481429"/>
           </a:xfrm>
           <a:prstGeom prst="rect">
             <a:avLst/>
           </a:prstGeom>
+          <a:ln w="3175" cmpd="sng">
+            <a:solidFill>
+              <a:srgbClr val="FF0000"/>
+            </a:solidFill>
+          </a:ln>
         </p:spPr>
       </p:pic>
-      <p:pic>
-        <p:nvPicPr>
-          <p:cNvPr id="16" name="Picture 15"/>
-          <p:cNvPicPr>
-            <a:picLocks noChangeAspect="1"/>
-          </p:cNvPicPr>
-          <p:nvPr/>
-        </p:nvPicPr>
-        <p:blipFill>
-          <a:blip r:embed="rId4"/>
-          <a:stretch>
-            <a:fillRect/>
-          </a:stretch>
-        </p:blipFill>
-        <p:spPr>
-          <a:xfrm>
-            <a:off x="22875016" y="33250744"/>
-            <a:ext cx="2467474" cy="2501900"/>
-          </a:xfrm>
-          <a:prstGeom prst="rect">
-            <a:avLst/>
-          </a:prstGeom>
-        </p:spPr>
-      </p:pic>
-      <p:pic>
-        <p:nvPicPr>
-          <p:cNvPr id="18" name="Picture 17"/>
-          <p:cNvPicPr>
-            <a:picLocks noChangeAspect="1"/>
-          </p:cNvPicPr>
-          <p:nvPr/>
-        </p:nvPicPr>
-        <p:blipFill>
-          <a:blip r:embed="rId5"/>
-          <a:stretch>
-            <a:fillRect/>
-          </a:stretch>
-        </p:blipFill>
-        <p:spPr>
-          <a:xfrm>
-            <a:off x="17261840" y="33250743"/>
-            <a:ext cx="5085162" cy="2501900"/>
-          </a:xfrm>
-          <a:prstGeom prst="rect">
-            <a:avLst/>
-          </a:prstGeom>
-        </p:spPr>
-      </p:pic>
-      <p:sp>
-        <p:nvSpPr>
-          <p:cNvPr id="23" name="Rectangle 22"/>
-          <p:cNvSpPr/>
-          <p:nvPr/>
-        </p:nvSpPr>
-        <p:spPr>
-          <a:xfrm>
-            <a:off x="7975600" y="33250743"/>
-            <a:ext cx="9286240" cy="2554545"/>
-          </a:xfrm>
-          <a:prstGeom prst="rect">
-            <a:avLst/>
-          </a:prstGeom>
-        </p:spPr>
-        <p:txBody>
-          <a:bodyPr wrap="square">
-            <a:spAutoFit/>
-          </a:bodyPr>
-          <a:lstStyle/>
-          <a:p>
-            <a:pPr algn="ctr"/>
-            <a:r>
-              <a:rPr lang="en-US" sz="4000" b="1" dirty="0" smtClean="0"/>
-              <a:t>Camille Cobb, Caitlin </a:t>
-            </a:r>
-            <a:r>
-              <a:rPr lang="en-US" sz="4000" b="1" dirty="0" err="1" smtClean="0"/>
-              <a:t>Bonnar</a:t>
-            </a:r>
-            <a:r>
-              <a:rPr lang="en-US" sz="4000" b="1" dirty="0" smtClean="0"/>
-              <a:t>, </a:t>
-            </a:r>
-          </a:p>
-          <a:p>
-            <a:pPr algn="ctr"/>
-            <a:r>
-              <a:rPr lang="en-US" sz="4000" b="1" dirty="0" smtClean="0"/>
-              <a:t>Yi Pan, Katie </a:t>
-            </a:r>
-            <a:r>
-              <a:rPr lang="en-US" sz="4000" b="1" dirty="0" err="1" smtClean="0"/>
-              <a:t>Kuksenok</a:t>
-            </a:r>
-            <a:r>
-              <a:rPr lang="en-US" sz="4000" b="1" dirty="0" smtClean="0"/>
-              <a:t> </a:t>
-            </a:r>
-          </a:p>
-          <a:p>
-            <a:pPr algn="ctr"/>
-            <a:r>
-              <a:rPr lang="en-US" sz="4000" dirty="0" smtClean="0"/>
-              <a:t>{cobbc12, </a:t>
-            </a:r>
-            <a:r>
-              <a:rPr lang="en-US" sz="4000" dirty="0" err="1" smtClean="0"/>
-              <a:t>cbonnar</a:t>
-            </a:r>
-            <a:r>
-              <a:rPr lang="en-US" sz="4000" dirty="0" smtClean="0"/>
-              <a:t>, pany5, </a:t>
-            </a:r>
-            <a:r>
-              <a:rPr lang="en-US" sz="4000" dirty="0" err="1" smtClean="0"/>
-              <a:t>kuksenok</a:t>
-            </a:r>
-            <a:r>
-              <a:rPr lang="en-US" sz="4000" dirty="0" smtClean="0"/>
-              <a:t>}</a:t>
-            </a:r>
-          </a:p>
-          <a:p>
-            <a:pPr algn="ctr"/>
-            <a:r>
-              <a:rPr lang="en-US" sz="4000" dirty="0" smtClean="0"/>
-              <a:t>@</a:t>
-            </a:r>
-            <a:r>
-              <a:rPr lang="en-US" sz="4000" dirty="0" err="1" smtClean="0"/>
-              <a:t>cs.washington.edu</a:t>
-            </a:r>
-            <a:endParaRPr lang="en-US" sz="4000" dirty="0" smtClean="0"/>
-          </a:p>
-        </p:txBody>
-      </p:sp>
-      <p:sp>
-        <p:nvSpPr>
-          <p:cNvPr id="25" name="Rectangle 24"/>
-          <p:cNvSpPr/>
-          <p:nvPr/>
-        </p:nvSpPr>
-        <p:spPr>
-          <a:xfrm>
-            <a:off x="904240" y="32488743"/>
-            <a:ext cx="7071360" cy="4801314"/>
-          </a:xfrm>
-          <a:prstGeom prst="rect">
-            <a:avLst/>
-          </a:prstGeom>
-        </p:spPr>
-        <p:txBody>
-          <a:bodyPr wrap="square">
-            <a:spAutoFit/>
-          </a:bodyPr>
-          <a:lstStyle/>
-          <a:p>
-            <a:pPr algn="ctr"/>
-            <a:r>
-              <a:rPr lang="en-US" sz="4800" dirty="0"/>
-              <a:t>CSE 512 Final </a:t>
-            </a:r>
-            <a:r>
-              <a:rPr lang="en-US" sz="4800" dirty="0" smtClean="0"/>
-              <a:t>Project</a:t>
-            </a:r>
-          </a:p>
-          <a:p>
-            <a:pPr algn="ctr"/>
-            <a:endParaRPr lang="en-US" sz="3000" dirty="0" smtClean="0">
-              <a:hlinkClick r:id="rId6"/>
-            </a:endParaRPr>
-          </a:p>
-          <a:p>
-            <a:pPr algn="ctr"/>
-            <a:r>
-              <a:rPr lang="en-US" sz="3000" dirty="0" smtClean="0">
-                <a:hlinkClick r:id="rId6"/>
-              </a:rPr>
-              <a:t>https</a:t>
-            </a:r>
-            <a:r>
-              <a:rPr lang="en-US" sz="3000" dirty="0">
-                <a:hlinkClick r:id="rId6"/>
-              </a:rPr>
-              <a:t>://github.com/CSE512-14W/fp-cobbc12-cbonnar-pany5-</a:t>
-            </a:r>
-            <a:r>
-              <a:rPr lang="en-US" sz="3000" dirty="0" smtClean="0">
-                <a:hlinkClick r:id="rId6"/>
-              </a:rPr>
-              <a:t>kuksenok</a:t>
-            </a:r>
-            <a:endParaRPr lang="en-US" sz="3000" dirty="0" smtClean="0"/>
-          </a:p>
-          <a:p>
-            <a:pPr algn="ctr"/>
-            <a:endParaRPr lang="en-US" sz="3000" dirty="0" smtClean="0"/>
-          </a:p>
-          <a:p>
-            <a:pPr algn="ctr"/>
-            <a:r>
-              <a:rPr lang="en-US" sz="3000" dirty="0">
-                <a:hlinkClick r:id="rId7"/>
-              </a:rPr>
-              <a:t>http://homes.cs.washington.edu/~cbonnar/viz/</a:t>
-            </a:r>
-            <a:r>
-              <a:rPr lang="en-US" sz="3000" dirty="0" smtClean="0">
-                <a:hlinkClick r:id="rId7"/>
-              </a:rPr>
-              <a:t>busviz.html</a:t>
-            </a:r>
-            <a:endParaRPr lang="en-US" sz="3000" dirty="0" smtClean="0"/>
-          </a:p>
-          <a:p>
-            <a:pPr algn="ctr"/>
-            <a:endParaRPr lang="en-US" sz="3000" dirty="0" smtClean="0"/>
-          </a:p>
-          <a:p>
-            <a:pPr algn="ctr"/>
-            <a:r>
-              <a:rPr lang="en-US" sz="4800" dirty="0" smtClean="0"/>
-              <a:t> </a:t>
-            </a:r>
-            <a:endParaRPr lang="en-US" sz="4000" dirty="0"/>
-          </a:p>
-        </p:txBody>
-      </p:sp>
     </p:spTree>
     <p:extLst>
       <p:ext uri="{BB962C8B-B14F-4D97-AF65-F5344CB8AC3E}">

</xml_diff>